<commit_message>
Adding Presentation information for 5-26-2021
</commit_message>
<xml_diff>
--- a/LED Images Data/Data on Training Set 1 and 2.pptx
+++ b/LED Images Data/Data on Training Set 1 and 2.pptx
@@ -9,6 +9,10 @@
     <p:sldId id="258" r:id="rId3"/>
     <p:sldId id="257" r:id="rId4"/>
     <p:sldId id="259" r:id="rId5"/>
+    <p:sldId id="260" r:id="rId6"/>
+    <p:sldId id="261" r:id="rId7"/>
+    <p:sldId id="262" r:id="rId8"/>
+    <p:sldId id="263" r:id="rId9"/>
   </p:sldIdLst>
   <p:sldSz cx="9144000" cy="6858000" type="screen4x3"/>
   <p:notesSz cx="6858000" cy="9144000"/>
@@ -3122,6 +3126,13 @@
   <p:clrMapOvr>
     <a:masterClrMapping/>
   </p:clrMapOvr>
+  <p:timing>
+    <p:tnLst>
+      <p:par>
+        <p:cTn id="1" dur="indefinite" restart="never" nodeType="tmRoot"/>
+      </p:par>
+    </p:tnLst>
+  </p:timing>
 </p:sld>
 </file>
 
@@ -3210,6 +3221,13 @@
   <p:clrMapOvr>
     <a:masterClrMapping/>
   </p:clrMapOvr>
+  <p:timing>
+    <p:tnLst>
+      <p:par>
+        <p:cTn id="1" dur="indefinite" restart="never" nodeType="tmRoot"/>
+      </p:par>
+    </p:tnLst>
+  </p:timing>
 </p:sld>
 </file>
 
@@ -5624,6 +5642,13 @@
   <p:clrMapOvr>
     <a:masterClrMapping/>
   </p:clrMapOvr>
+  <p:timing>
+    <p:tnLst>
+      <p:par>
+        <p:cTn id="1" dur="indefinite" restart="never" nodeType="tmRoot"/>
+      </p:par>
+    </p:tnLst>
+  </p:timing>
 </p:sld>
 </file>
 
@@ -5659,6 +5684,10 @@
           <a:bodyPr/>
           <a:lstStyle/>
           <a:p>
+            <a:r>
+              <a:rPr lang="en-US" dirty="0" smtClean="0"/>
+              <a:t>Visualization of Accuracy</a:t>
+            </a:r>
             <a:endParaRPr lang="en-US" dirty="0"/>
           </a:p>
         </p:txBody>
@@ -5673,15 +5702,70 @@
             <p:ph idx="1"/>
           </p:nvPr>
         </p:nvSpPr>
-        <p:spPr/>
-        <p:txBody>
-          <a:bodyPr/>
+        <p:spPr>
+          <a:xfrm>
+            <a:off x="457200" y="5486400"/>
+            <a:ext cx="8229600" cy="639763"/>
+          </a:xfrm>
+        </p:spPr>
+        <p:txBody>
+          <a:bodyPr>
+            <a:normAutofit fontScale="92500"/>
+          </a:bodyPr>
           <a:lstStyle/>
           <a:p>
-            <a:endParaRPr lang="en-US"/>
-          </a:p>
-        </p:txBody>
-      </p:sp>
+            <a:pPr marL="0" indent="0">
+              <a:buNone/>
+            </a:pPr>
+            <a:r>
+              <a:rPr lang="en-US" dirty="0" smtClean="0"/>
+              <a:t>Training Set 1 (beads-dust): accuracy threshold .2</a:t>
+            </a:r>
+            <a:endParaRPr lang="en-US" dirty="0"/>
+          </a:p>
+        </p:txBody>
+      </p:sp>
+      <p:pic>
+        <p:nvPicPr>
+          <p:cNvPr id="1026" name="Picture 2" descr="C:\Users\Jonathan Xiong\Documents\College\UCSD\Biomedics Project under Professor Yu-Hwa Lo\Lenseless-Plate-Reader\LED Images Data\Training Set 1 (bead,dust)\Tested Images\image0018.jpg"/>
+          <p:cNvPicPr>
+            <a:picLocks noChangeAspect="1" noChangeArrowheads="1"/>
+          </p:cNvPicPr>
+          <p:nvPr/>
+        </p:nvPicPr>
+        <p:blipFill>
+          <a:blip r:embed="rId2" cstate="print">
+            <a:extLst>
+              <a:ext uri="{28A0092B-C50C-407E-A947-70E740481C1C}">
+                <a14:useLocalDpi xmlns:a14="http://schemas.microsoft.com/office/drawing/2010/main" val="0"/>
+              </a:ext>
+            </a:extLst>
+          </a:blip>
+          <a:srcRect/>
+          <a:stretch>
+            <a:fillRect/>
+          </a:stretch>
+        </p:blipFill>
+        <p:spPr bwMode="auto">
+          <a:xfrm>
+            <a:off x="838200" y="1219200"/>
+            <a:ext cx="7538190" cy="4252913"/>
+          </a:xfrm>
+          <a:prstGeom prst="rect">
+            <a:avLst/>
+          </a:prstGeom>
+          <a:noFill/>
+          <a:extLst>
+            <a:ext uri="{909E8E84-426E-40DD-AFC4-6F175D3DCCD1}">
+              <a14:hiddenFill xmlns:a14="http://schemas.microsoft.com/office/drawing/2010/main">
+                <a:solidFill>
+                  <a:srgbClr val="FFFFFF"/>
+                </a:solidFill>
+              </a14:hiddenFill>
+            </a:ext>
+          </a:extLst>
+        </p:spPr>
+      </p:pic>
     </p:spTree>
     <p:extLst>
       <p:ext uri="{BB962C8B-B14F-4D97-AF65-F5344CB8AC3E}">
@@ -5692,6 +5776,624 @@
   <p:clrMapOvr>
     <a:masterClrMapping/>
   </p:clrMapOvr>
+  <p:timing>
+    <p:tnLst>
+      <p:par>
+        <p:cTn id="1" dur="indefinite" restart="never" nodeType="tmRoot"/>
+      </p:par>
+    </p:tnLst>
+  </p:timing>
+</p:sld>
+</file>
+
+<file path=ppt/slides/slide5.xml><?xml version="1.0" encoding="utf-8"?>
+<p:sld xmlns:a="http://schemas.openxmlformats.org/drawingml/2006/main" xmlns:r="http://schemas.openxmlformats.org/officeDocument/2006/relationships" xmlns:p="http://schemas.openxmlformats.org/presentationml/2006/main">
+  <p:cSld>
+    <p:spTree>
+      <p:nvGrpSpPr>
+        <p:cNvPr id="1" name=""/>
+        <p:cNvGrpSpPr/>
+        <p:nvPr/>
+      </p:nvGrpSpPr>
+      <p:grpSpPr>
+        <a:xfrm>
+          <a:off x="0" y="0"/>
+          <a:ext cx="0" cy="0"/>
+          <a:chOff x="0" y="0"/>
+          <a:chExt cx="0" cy="0"/>
+        </a:xfrm>
+      </p:grpSpPr>
+      <p:sp>
+        <p:nvSpPr>
+          <p:cNvPr id="2" name="Title 1"/>
+          <p:cNvSpPr>
+            <a:spLocks noGrp="1"/>
+          </p:cNvSpPr>
+          <p:nvPr>
+            <p:ph type="title"/>
+          </p:nvPr>
+        </p:nvSpPr>
+        <p:spPr/>
+        <p:txBody>
+          <a:bodyPr/>
+          <a:lstStyle/>
+          <a:p>
+            <a:r>
+              <a:rPr lang="en-US" dirty="0" smtClean="0"/>
+              <a:t>Visualization of Accuracy</a:t>
+            </a:r>
+            <a:endParaRPr lang="en-US" dirty="0"/>
+          </a:p>
+        </p:txBody>
+      </p:sp>
+      <p:sp>
+        <p:nvSpPr>
+          <p:cNvPr id="3" name="Content Placeholder 2"/>
+          <p:cNvSpPr>
+            <a:spLocks noGrp="1"/>
+          </p:cNvSpPr>
+          <p:nvPr>
+            <p:ph idx="1"/>
+          </p:nvPr>
+        </p:nvSpPr>
+        <p:spPr>
+          <a:xfrm>
+            <a:off x="457200" y="5486400"/>
+            <a:ext cx="8229600" cy="639763"/>
+          </a:xfrm>
+        </p:spPr>
+        <p:txBody>
+          <a:bodyPr>
+            <a:normAutofit/>
+          </a:bodyPr>
+          <a:lstStyle/>
+          <a:p>
+            <a:pPr marL="0" indent="0">
+              <a:buNone/>
+            </a:pPr>
+            <a:r>
+              <a:rPr lang="en-US" dirty="0" smtClean="0"/>
+              <a:t>Training Set 2 (beads): accuracy threshold .2</a:t>
+            </a:r>
+            <a:endParaRPr lang="en-US" dirty="0"/>
+          </a:p>
+        </p:txBody>
+      </p:sp>
+      <p:pic>
+        <p:nvPicPr>
+          <p:cNvPr id="2050" name="Picture 2" descr="C:\Users\Jonathan Xiong\Documents\College\UCSD\Biomedics Project under Professor Yu-Hwa Lo\Lenseless-Plate-Reader\LED Images Data\Training Set 2 (bead)\Tested Images\image0018.jpg"/>
+          <p:cNvPicPr>
+            <a:picLocks noChangeAspect="1" noChangeArrowheads="1"/>
+          </p:cNvPicPr>
+          <p:nvPr/>
+        </p:nvPicPr>
+        <p:blipFill>
+          <a:blip r:embed="rId2" cstate="print">
+            <a:extLst>
+              <a:ext uri="{28A0092B-C50C-407E-A947-70E740481C1C}">
+                <a14:useLocalDpi xmlns:a14="http://schemas.microsoft.com/office/drawing/2010/main" val="0"/>
+              </a:ext>
+            </a:extLst>
+          </a:blip>
+          <a:srcRect/>
+          <a:stretch>
+            <a:fillRect/>
+          </a:stretch>
+        </p:blipFill>
+        <p:spPr bwMode="auto">
+          <a:xfrm>
+            <a:off x="609600" y="1143000"/>
+            <a:ext cx="7369969" cy="4158005"/>
+          </a:xfrm>
+          <a:prstGeom prst="rect">
+            <a:avLst/>
+          </a:prstGeom>
+          <a:noFill/>
+          <a:extLst>
+            <a:ext uri="{909E8E84-426E-40DD-AFC4-6F175D3DCCD1}">
+              <a14:hiddenFill xmlns:a14="http://schemas.microsoft.com/office/drawing/2010/main">
+                <a:solidFill>
+                  <a:srgbClr val="FFFFFF"/>
+                </a:solidFill>
+              </a14:hiddenFill>
+            </a:ext>
+          </a:extLst>
+        </p:spPr>
+      </p:pic>
+    </p:spTree>
+    <p:extLst>
+      <p:ext uri="{BB962C8B-B14F-4D97-AF65-F5344CB8AC3E}">
+        <p14:creationId xmlns:p14="http://schemas.microsoft.com/office/powerpoint/2010/main" val="3275101062"/>
+      </p:ext>
+    </p:extLst>
+  </p:cSld>
+  <p:clrMapOvr>
+    <a:masterClrMapping/>
+  </p:clrMapOvr>
+  <p:timing>
+    <p:tnLst>
+      <p:par>
+        <p:cTn id="1" dur="indefinite" restart="never" nodeType="tmRoot"/>
+      </p:par>
+    </p:tnLst>
+  </p:timing>
+</p:sld>
+</file>
+
+<file path=ppt/slides/slide6.xml><?xml version="1.0" encoding="utf-8"?>
+<p:sld xmlns:a="http://schemas.openxmlformats.org/drawingml/2006/main" xmlns:r="http://schemas.openxmlformats.org/officeDocument/2006/relationships" xmlns:p="http://schemas.openxmlformats.org/presentationml/2006/main">
+  <p:cSld>
+    <p:spTree>
+      <p:nvGrpSpPr>
+        <p:cNvPr id="1" name=""/>
+        <p:cNvGrpSpPr/>
+        <p:nvPr/>
+      </p:nvGrpSpPr>
+      <p:grpSpPr>
+        <a:xfrm>
+          <a:off x="0" y="0"/>
+          <a:ext cx="0" cy="0"/>
+          <a:chOff x="0" y="0"/>
+          <a:chExt cx="0" cy="0"/>
+        </a:xfrm>
+      </p:grpSpPr>
+      <p:sp>
+        <p:nvSpPr>
+          <p:cNvPr id="2" name="Title 1"/>
+          <p:cNvSpPr>
+            <a:spLocks noGrp="1"/>
+          </p:cNvSpPr>
+          <p:nvPr>
+            <p:ph type="title"/>
+          </p:nvPr>
+        </p:nvSpPr>
+        <p:spPr/>
+        <p:txBody>
+          <a:bodyPr/>
+          <a:lstStyle/>
+          <a:p>
+            <a:r>
+              <a:rPr lang="en-US" dirty="0" smtClean="0"/>
+              <a:t>Next Step: Improvements</a:t>
+            </a:r>
+            <a:endParaRPr lang="en-US" dirty="0"/>
+          </a:p>
+        </p:txBody>
+      </p:sp>
+      <p:sp>
+        <p:nvSpPr>
+          <p:cNvPr id="3" name="Content Placeholder 2"/>
+          <p:cNvSpPr>
+            <a:spLocks noGrp="1"/>
+          </p:cNvSpPr>
+          <p:nvPr>
+            <p:ph idx="1"/>
+          </p:nvPr>
+        </p:nvSpPr>
+        <p:spPr/>
+        <p:txBody>
+          <a:bodyPr/>
+          <a:lstStyle/>
+          <a:p>
+            <a:pPr marL="514350" indent="-514350">
+              <a:buAutoNum type="arabicPeriod"/>
+            </a:pPr>
+            <a:r>
+              <a:rPr lang="en-US" dirty="0" smtClean="0"/>
+              <a:t>Splitting Images into smaller resolution sizes.</a:t>
+            </a:r>
+          </a:p>
+          <a:p>
+            <a:pPr marL="514350" indent="-514350">
+              <a:buAutoNum type="arabicPeriod"/>
+            </a:pPr>
+            <a:r>
+              <a:rPr lang="en-US" dirty="0" smtClean="0"/>
+              <a:t>Selecting Clear Images for training and testing.</a:t>
+            </a:r>
+          </a:p>
+          <a:p>
+            <a:pPr marL="514350" indent="-514350">
+              <a:buAutoNum type="arabicPeriod"/>
+            </a:pPr>
+            <a:endParaRPr lang="en-US" dirty="0" smtClean="0"/>
+          </a:p>
+        </p:txBody>
+      </p:sp>
+      <p:sp>
+        <p:nvSpPr>
+          <p:cNvPr id="4" name="Rounded Rectangle 3"/>
+          <p:cNvSpPr/>
+          <p:nvPr/>
+        </p:nvSpPr>
+        <p:spPr>
+          <a:xfrm>
+            <a:off x="304800" y="1524000"/>
+            <a:ext cx="8305800" cy="685800"/>
+          </a:xfrm>
+          <a:prstGeom prst="roundRect">
+            <a:avLst/>
+          </a:prstGeom>
+          <a:noFill/>
+          <a:ln>
+            <a:solidFill>
+              <a:schemeClr val="tx2"/>
+            </a:solidFill>
+          </a:ln>
+        </p:spPr>
+        <p:style>
+          <a:lnRef idx="2">
+            <a:schemeClr val="accent1">
+              <a:shade val="50000"/>
+            </a:schemeClr>
+          </a:lnRef>
+          <a:fillRef idx="1">
+            <a:schemeClr val="accent1"/>
+          </a:fillRef>
+          <a:effectRef idx="0">
+            <a:schemeClr val="accent1"/>
+          </a:effectRef>
+          <a:fontRef idx="minor">
+            <a:schemeClr val="lt1"/>
+          </a:fontRef>
+        </p:style>
+        <p:txBody>
+          <a:bodyPr rtlCol="0" anchor="ctr"/>
+          <a:lstStyle/>
+          <a:p>
+            <a:pPr algn="ctr"/>
+            <a:endParaRPr lang="en-US"/>
+          </a:p>
+        </p:txBody>
+      </p:sp>
+    </p:spTree>
+    <p:extLst>
+      <p:ext uri="{BB962C8B-B14F-4D97-AF65-F5344CB8AC3E}">
+        <p14:creationId xmlns:p14="http://schemas.microsoft.com/office/powerpoint/2010/main" val="3643894377"/>
+      </p:ext>
+    </p:extLst>
+  </p:cSld>
+  <p:clrMapOvr>
+    <a:masterClrMapping/>
+  </p:clrMapOvr>
+  <mc:AlternateContent xmlns:mc="http://schemas.openxmlformats.org/markup-compatibility/2006">
+    <mc:Choice xmlns:p14="http://schemas.microsoft.com/office/powerpoint/2010/main" Requires="p14">
+      <p:transition p14:dur="0"/>
+    </mc:Choice>
+    <mc:Fallback>
+      <p:transition/>
+    </mc:Fallback>
+  </mc:AlternateContent>
+  <p:timing>
+    <p:tnLst>
+      <p:par>
+        <p:cTn id="1" dur="indefinite" restart="never" nodeType="tmRoot">
+          <p:childTnLst>
+            <p:seq concurrent="1" nextAc="seek">
+              <p:cTn id="2" dur="indefinite" nodeType="mainSeq">
+                <p:childTnLst>
+                  <p:par>
+                    <p:cTn id="3" fill="hold">
+                      <p:stCondLst>
+                        <p:cond delay="indefinite"/>
+                      </p:stCondLst>
+                      <p:childTnLst>
+                        <p:par>
+                          <p:cTn id="4" fill="hold">
+                            <p:stCondLst>
+                              <p:cond delay="0"/>
+                            </p:stCondLst>
+                            <p:childTnLst>
+                              <p:par>
+                                <p:cTn id="5" presetID="1" presetClass="entr" presetSubtype="0" fill="hold" grpId="0" nodeType="clickEffect">
+                                  <p:stCondLst>
+                                    <p:cond delay="0"/>
+                                  </p:stCondLst>
+                                  <p:childTnLst>
+                                    <p:set>
+                                      <p:cBhvr>
+                                        <p:cTn id="6" dur="1" fill="hold">
+                                          <p:stCondLst>
+                                            <p:cond delay="0"/>
+                                          </p:stCondLst>
+                                        </p:cTn>
+                                        <p:tgtEl>
+                                          <p:spTgt spid="4"/>
+                                        </p:tgtEl>
+                                        <p:attrNameLst>
+                                          <p:attrName>style.visibility</p:attrName>
+                                        </p:attrNameLst>
+                                      </p:cBhvr>
+                                      <p:to>
+                                        <p:strVal val="visible"/>
+                                      </p:to>
+                                    </p:set>
+                                  </p:childTnLst>
+                                </p:cTn>
+                              </p:par>
+                            </p:childTnLst>
+                          </p:cTn>
+                        </p:par>
+                      </p:childTnLst>
+                    </p:cTn>
+                  </p:par>
+                </p:childTnLst>
+              </p:cTn>
+              <p:prevCondLst>
+                <p:cond evt="onPrev" delay="0">
+                  <p:tgtEl>
+                    <p:sldTgt/>
+                  </p:tgtEl>
+                </p:cond>
+              </p:prevCondLst>
+              <p:nextCondLst>
+                <p:cond evt="onNext" delay="0">
+                  <p:tgtEl>
+                    <p:sldTgt/>
+                  </p:tgtEl>
+                </p:cond>
+              </p:nextCondLst>
+            </p:seq>
+          </p:childTnLst>
+        </p:cTn>
+      </p:par>
+    </p:tnLst>
+    <p:bldLst>
+      <p:bldP spid="4" grpId="0" animBg="1"/>
+    </p:bldLst>
+  </p:timing>
+</p:sld>
+</file>
+
+<file path=ppt/slides/slide7.xml><?xml version="1.0" encoding="utf-8"?>
+<p:sld xmlns:a="http://schemas.openxmlformats.org/drawingml/2006/main" xmlns:r="http://schemas.openxmlformats.org/officeDocument/2006/relationships" xmlns:p="http://schemas.openxmlformats.org/presentationml/2006/main">
+  <p:cSld>
+    <p:spTree>
+      <p:nvGrpSpPr>
+        <p:cNvPr id="1" name=""/>
+        <p:cNvGrpSpPr/>
+        <p:nvPr/>
+      </p:nvGrpSpPr>
+      <p:grpSpPr>
+        <a:xfrm>
+          <a:off x="0" y="0"/>
+          <a:ext cx="0" cy="0"/>
+          <a:chOff x="0" y="0"/>
+          <a:chExt cx="0" cy="0"/>
+        </a:xfrm>
+      </p:grpSpPr>
+      <p:sp>
+        <p:nvSpPr>
+          <p:cNvPr id="2" name="Title 1"/>
+          <p:cNvSpPr>
+            <a:spLocks noGrp="1"/>
+          </p:cNvSpPr>
+          <p:nvPr>
+            <p:ph type="title"/>
+          </p:nvPr>
+        </p:nvSpPr>
+        <p:spPr/>
+        <p:txBody>
+          <a:bodyPr/>
+          <a:lstStyle/>
+          <a:p>
+            <a:r>
+              <a:rPr lang="en-US" dirty="0" smtClean="0"/>
+              <a:t>1. Splitting Images</a:t>
+            </a:r>
+            <a:endParaRPr lang="en-US" dirty="0"/>
+          </a:p>
+        </p:txBody>
+      </p:sp>
+      <p:sp>
+        <p:nvSpPr>
+          <p:cNvPr id="3" name="Content Placeholder 2"/>
+          <p:cNvSpPr>
+            <a:spLocks noGrp="1"/>
+          </p:cNvSpPr>
+          <p:nvPr>
+            <p:ph idx="1"/>
+          </p:nvPr>
+        </p:nvSpPr>
+        <p:spPr/>
+        <p:txBody>
+          <a:bodyPr>
+            <a:normAutofit fontScale="92500" lnSpcReduction="10000"/>
+          </a:bodyPr>
+          <a:lstStyle/>
+          <a:p>
+            <a:r>
+              <a:rPr lang="en-US" dirty="0" smtClean="0"/>
+              <a:t>From 3864x2080p to ~552x298p</a:t>
+            </a:r>
+          </a:p>
+          <a:p>
+            <a:r>
+              <a:rPr lang="en-US" dirty="0" smtClean="0"/>
+              <a:t>Less features for model to work with and correlate to form objects</a:t>
+            </a:r>
+          </a:p>
+          <a:p>
+            <a:r>
+              <a:rPr lang="en-US" dirty="0" smtClean="0"/>
+              <a:t>Development Steps:</a:t>
+            </a:r>
+          </a:p>
+          <a:p>
+            <a:pPr lvl="1"/>
+            <a:r>
+              <a:rPr lang="en-US" dirty="0" smtClean="0"/>
+              <a:t>Training:</a:t>
+            </a:r>
+          </a:p>
+          <a:p>
+            <a:pPr lvl="2"/>
+            <a:r>
+              <a:rPr lang="en-US" dirty="0" smtClean="0"/>
+              <a:t>Crop images and annotations </a:t>
+            </a:r>
+          </a:p>
+          <a:p>
+            <a:pPr lvl="1"/>
+            <a:r>
+              <a:rPr lang="en-US" dirty="0" smtClean="0"/>
+              <a:t>Detection:</a:t>
+            </a:r>
+          </a:p>
+          <a:p>
+            <a:pPr lvl="2"/>
+            <a:r>
+              <a:rPr lang="en-US" dirty="0" smtClean="0"/>
+              <a:t>Find average area, width, length of beads.</a:t>
+            </a:r>
+          </a:p>
+          <a:p>
+            <a:pPr lvl="2"/>
+            <a:r>
+              <a:rPr lang="en-US" dirty="0" smtClean="0"/>
+              <a:t>Create simple machine learning algorithm to piece together objects of edges of cropped images.</a:t>
+            </a:r>
+            <a:endParaRPr lang="en-US" dirty="0"/>
+          </a:p>
+        </p:txBody>
+      </p:sp>
+    </p:spTree>
+    <p:extLst>
+      <p:ext uri="{BB962C8B-B14F-4D97-AF65-F5344CB8AC3E}">
+        <p14:creationId xmlns:p14="http://schemas.microsoft.com/office/powerpoint/2010/main" val="2429062578"/>
+      </p:ext>
+    </p:extLst>
+  </p:cSld>
+  <p:clrMapOvr>
+    <a:masterClrMapping/>
+  </p:clrMapOvr>
+  <p:timing>
+    <p:tnLst>
+      <p:par>
+        <p:cTn id="1" dur="indefinite" restart="never" nodeType="tmRoot"/>
+      </p:par>
+    </p:tnLst>
+  </p:timing>
+</p:sld>
+</file>
+
+<file path=ppt/slides/slide8.xml><?xml version="1.0" encoding="utf-8"?>
+<p:sld xmlns:a="http://schemas.openxmlformats.org/drawingml/2006/main" xmlns:r="http://schemas.openxmlformats.org/officeDocument/2006/relationships" xmlns:p="http://schemas.openxmlformats.org/presentationml/2006/main">
+  <p:cSld>
+    <p:spTree>
+      <p:nvGrpSpPr>
+        <p:cNvPr id="1" name=""/>
+        <p:cNvGrpSpPr/>
+        <p:nvPr/>
+      </p:nvGrpSpPr>
+      <p:grpSpPr>
+        <a:xfrm>
+          <a:off x="0" y="0"/>
+          <a:ext cx="0" cy="0"/>
+          <a:chOff x="0" y="0"/>
+          <a:chExt cx="0" cy="0"/>
+        </a:xfrm>
+      </p:grpSpPr>
+      <p:sp>
+        <p:nvSpPr>
+          <p:cNvPr id="2" name="Title 1"/>
+          <p:cNvSpPr>
+            <a:spLocks noGrp="1"/>
+          </p:cNvSpPr>
+          <p:nvPr>
+            <p:ph type="title"/>
+          </p:nvPr>
+        </p:nvSpPr>
+        <p:spPr/>
+        <p:txBody>
+          <a:bodyPr/>
+          <a:lstStyle/>
+          <a:p>
+            <a:r>
+              <a:rPr lang="en-US" dirty="0" smtClean="0"/>
+              <a:t>1. Splitting Images Visualization</a:t>
+            </a:r>
+            <a:endParaRPr lang="en-US" dirty="0"/>
+          </a:p>
+        </p:txBody>
+      </p:sp>
+      <p:sp>
+        <p:nvSpPr>
+          <p:cNvPr id="3" name="Content Placeholder 2"/>
+          <p:cNvSpPr>
+            <a:spLocks noGrp="1"/>
+          </p:cNvSpPr>
+          <p:nvPr>
+            <p:ph idx="1"/>
+          </p:nvPr>
+        </p:nvSpPr>
+        <p:spPr/>
+        <p:txBody>
+          <a:bodyPr/>
+          <a:lstStyle/>
+          <a:p>
+            <a:endParaRPr lang="en-US"/>
+          </a:p>
+        </p:txBody>
+      </p:sp>
+      <p:pic>
+        <p:nvPicPr>
+          <p:cNvPr id="3074" name="Picture 2" descr="C:\Users\Jonathan Xiong\Documents\College\UCSD\Biomedics Project under Professor Yu-Hwa Lo\Lenseless-Plate-Reader\LED Images Data\Visualization Images\Splitting Images Problem Representation.jpg"/>
+          <p:cNvPicPr>
+            <a:picLocks noChangeAspect="1" noChangeArrowheads="1"/>
+          </p:cNvPicPr>
+          <p:nvPr/>
+        </p:nvPicPr>
+        <p:blipFill>
+          <a:blip r:embed="rId2">
+            <a:extLst>
+              <a:ext uri="{28A0092B-C50C-407E-A947-70E740481C1C}">
+                <a14:useLocalDpi xmlns:a14="http://schemas.microsoft.com/office/drawing/2010/main" val="0"/>
+              </a:ext>
+            </a:extLst>
+          </a:blip>
+          <a:srcRect/>
+          <a:stretch>
+            <a:fillRect/>
+          </a:stretch>
+        </p:blipFill>
+        <p:spPr bwMode="auto">
+          <a:xfrm>
+            <a:off x="533400" y="1524000"/>
+            <a:ext cx="8121650" cy="4610100"/>
+          </a:xfrm>
+          <a:prstGeom prst="rect">
+            <a:avLst/>
+          </a:prstGeom>
+          <a:noFill/>
+          <a:extLst>
+            <a:ext uri="{909E8E84-426E-40DD-AFC4-6F175D3DCCD1}">
+              <a14:hiddenFill xmlns:a14="http://schemas.microsoft.com/office/drawing/2010/main">
+                <a:solidFill>
+                  <a:srgbClr val="FFFFFF"/>
+                </a:solidFill>
+              </a14:hiddenFill>
+            </a:ext>
+          </a:extLst>
+        </p:spPr>
+      </p:pic>
+    </p:spTree>
+    <p:extLst>
+      <p:ext uri="{BB962C8B-B14F-4D97-AF65-F5344CB8AC3E}">
+        <p14:creationId xmlns:p14="http://schemas.microsoft.com/office/powerpoint/2010/main" val="1449196485"/>
+      </p:ext>
+    </p:extLst>
+  </p:cSld>
+  <p:clrMapOvr>
+    <a:masterClrMapping/>
+  </p:clrMapOvr>
+  <p:timing>
+    <p:tnLst>
+      <p:par>
+        <p:cTn id="1" dur="indefinite" restart="never" nodeType="tmRoot"/>
+      </p:par>
+    </p:tnLst>
+  </p:timing>
 </p:sld>
 </file>
 

</xml_diff>